<commit_message>
Sketcher tweaks and tribes
Made canvas always be vertically centered. Added good-looking screen
notifications for rotating phone and when screen is too small, and added
tribe-changing functionality (blue green and orange so far). IE is not
happy with some button stuff, will look for bug later.
</commit_message>
<xml_diff>
--- a/misc/buttons.pptx
+++ b/misc/buttons.pptx
@@ -197,7 +197,7 @@
           <a:p>
             <a:fld id="{F93FD218-EFF3-40C5-866D-41D18BDC6D38}" type="datetimeFigureOut">
               <a:rPr lang="en-US" smtClean="0"/>
-              <a:t>4/23/2016</a:t>
+              <a:t>4/24/2016</a:t>
             </a:fld>
             <a:endParaRPr lang="en-US"/>
           </a:p>
@@ -680,7 +680,7 @@
           <a:p>
             <a:fld id="{1BE169FF-B685-44E8-A3F0-1FFDDF01A7C5}" type="datetimeFigureOut">
               <a:rPr lang="en-US" smtClean="0"/>
-              <a:t>4/23/2016</a:t>
+              <a:t>4/24/2016</a:t>
             </a:fld>
             <a:endParaRPr lang="en-US"/>
           </a:p>
@@ -850,7 +850,7 @@
           <a:p>
             <a:fld id="{1BE169FF-B685-44E8-A3F0-1FFDDF01A7C5}" type="datetimeFigureOut">
               <a:rPr lang="en-US" smtClean="0"/>
-              <a:t>4/23/2016</a:t>
+              <a:t>4/24/2016</a:t>
             </a:fld>
             <a:endParaRPr lang="en-US"/>
           </a:p>
@@ -1030,7 +1030,7 @@
           <a:p>
             <a:fld id="{1BE169FF-B685-44E8-A3F0-1FFDDF01A7C5}" type="datetimeFigureOut">
               <a:rPr lang="en-US" smtClean="0"/>
-              <a:t>4/23/2016</a:t>
+              <a:t>4/24/2016</a:t>
             </a:fld>
             <a:endParaRPr lang="en-US"/>
           </a:p>
@@ -1200,7 +1200,7 @@
           <a:p>
             <a:fld id="{1BE169FF-B685-44E8-A3F0-1FFDDF01A7C5}" type="datetimeFigureOut">
               <a:rPr lang="en-US" smtClean="0"/>
-              <a:t>4/23/2016</a:t>
+              <a:t>4/24/2016</a:t>
             </a:fld>
             <a:endParaRPr lang="en-US"/>
           </a:p>
@@ -1444,7 +1444,7 @@
           <a:p>
             <a:fld id="{1BE169FF-B685-44E8-A3F0-1FFDDF01A7C5}" type="datetimeFigureOut">
               <a:rPr lang="en-US" smtClean="0"/>
-              <a:t>4/23/2016</a:t>
+              <a:t>4/24/2016</a:t>
             </a:fld>
             <a:endParaRPr lang="en-US"/>
           </a:p>
@@ -1676,7 +1676,7 @@
           <a:p>
             <a:fld id="{1BE169FF-B685-44E8-A3F0-1FFDDF01A7C5}" type="datetimeFigureOut">
               <a:rPr lang="en-US" smtClean="0"/>
-              <a:t>4/23/2016</a:t>
+              <a:t>4/24/2016</a:t>
             </a:fld>
             <a:endParaRPr lang="en-US"/>
           </a:p>
@@ -2043,7 +2043,7 @@
           <a:p>
             <a:fld id="{1BE169FF-B685-44E8-A3F0-1FFDDF01A7C5}" type="datetimeFigureOut">
               <a:rPr lang="en-US" smtClean="0"/>
-              <a:t>4/23/2016</a:t>
+              <a:t>4/24/2016</a:t>
             </a:fld>
             <a:endParaRPr lang="en-US"/>
           </a:p>
@@ -2161,7 +2161,7 @@
           <a:p>
             <a:fld id="{1BE169FF-B685-44E8-A3F0-1FFDDF01A7C5}" type="datetimeFigureOut">
               <a:rPr lang="en-US" smtClean="0"/>
-              <a:t>4/23/2016</a:t>
+              <a:t>4/24/2016</a:t>
             </a:fld>
             <a:endParaRPr lang="en-US"/>
           </a:p>
@@ -2256,7 +2256,7 @@
           <a:p>
             <a:fld id="{1BE169FF-B685-44E8-A3F0-1FFDDF01A7C5}" type="datetimeFigureOut">
               <a:rPr lang="en-US" smtClean="0"/>
-              <a:t>4/23/2016</a:t>
+              <a:t>4/24/2016</a:t>
             </a:fld>
             <a:endParaRPr lang="en-US"/>
           </a:p>
@@ -2533,7 +2533,7 @@
           <a:p>
             <a:fld id="{1BE169FF-B685-44E8-A3F0-1FFDDF01A7C5}" type="datetimeFigureOut">
               <a:rPr lang="en-US" smtClean="0"/>
-              <a:t>4/23/2016</a:t>
+              <a:t>4/24/2016</a:t>
             </a:fld>
             <a:endParaRPr lang="en-US"/>
           </a:p>
@@ -2790,7 +2790,7 @@
           <a:p>
             <a:fld id="{1BE169FF-B685-44E8-A3F0-1FFDDF01A7C5}" type="datetimeFigureOut">
               <a:rPr lang="en-US" smtClean="0"/>
-              <a:t>4/23/2016</a:t>
+              <a:t>4/24/2016</a:t>
             </a:fld>
             <a:endParaRPr lang="en-US"/>
           </a:p>
@@ -3003,7 +3003,7 @@
           <a:p>
             <a:fld id="{1BE169FF-B685-44E8-A3F0-1FFDDF01A7C5}" type="datetimeFigureOut">
               <a:rPr lang="en-US" smtClean="0"/>
-              <a:t>4/23/2016</a:t>
+              <a:t>4/24/2016</a:t>
             </a:fld>
             <a:endParaRPr lang="en-US"/>
           </a:p>
@@ -59014,6 +59014,2302 @@
           </a:p>
         </p:txBody>
       </p:sp>
+      <p:grpSp>
+        <p:nvGrpSpPr>
+          <p:cNvPr id="7" name="Group 6"/>
+          <p:cNvGrpSpPr/>
+          <p:nvPr/>
+        </p:nvGrpSpPr>
+        <p:grpSpPr>
+          <a:xfrm>
+            <a:off x="20084758" y="1149306"/>
+            <a:ext cx="1402911" cy="970699"/>
+            <a:chOff x="20265805" y="3422704"/>
+            <a:chExt cx="1402911" cy="970699"/>
+          </a:xfrm>
+        </p:grpSpPr>
+        <p:sp>
+          <p:nvSpPr>
+            <p:cNvPr id="1263" name="Rectangle 1262"/>
+            <p:cNvSpPr/>
+            <p:nvPr/>
+          </p:nvSpPr>
+          <p:spPr>
+            <a:xfrm>
+              <a:off x="20325080" y="3422704"/>
+              <a:ext cx="1291558" cy="970699"/>
+            </a:xfrm>
+            <a:prstGeom prst="rect">
+              <a:avLst/>
+            </a:prstGeom>
+            <a:solidFill>
+              <a:schemeClr val="accent5">
+                <a:lumMod val="40000"/>
+                <a:lumOff val="60000"/>
+              </a:schemeClr>
+            </a:solidFill>
+            <a:ln w="22225">
+              <a:noFill/>
+            </a:ln>
+            <a:effectLst/>
+          </p:spPr>
+          <p:style>
+            <a:lnRef idx="2">
+              <a:schemeClr val="accent1">
+                <a:shade val="50000"/>
+              </a:schemeClr>
+            </a:lnRef>
+            <a:fillRef idx="1">
+              <a:schemeClr val="accent1"/>
+            </a:fillRef>
+            <a:effectRef idx="0">
+              <a:schemeClr val="accent1"/>
+            </a:effectRef>
+            <a:fontRef idx="minor">
+              <a:schemeClr val="lt1"/>
+            </a:fontRef>
+          </p:style>
+          <p:txBody>
+            <a:bodyPr rtlCol="0" anchor="ctr"/>
+            <a:lstStyle/>
+            <a:p>
+              <a:pPr algn="ctr"/>
+              <a:endParaRPr lang="en-US">
+                <a:solidFill>
+                  <a:schemeClr val="accent5">
+                    <a:lumMod val="75000"/>
+                  </a:schemeClr>
+                </a:solidFill>
+              </a:endParaRPr>
+            </a:p>
+          </p:txBody>
+        </p:sp>
+        <p:sp>
+          <p:nvSpPr>
+            <p:cNvPr id="1291" name="Rectangle 1290"/>
+            <p:cNvSpPr/>
+            <p:nvPr/>
+          </p:nvSpPr>
+          <p:spPr>
+            <a:xfrm>
+              <a:off x="20265805" y="3422704"/>
+              <a:ext cx="1402911" cy="440742"/>
+            </a:xfrm>
+            <a:prstGeom prst="rect">
+              <a:avLst/>
+            </a:prstGeom>
+            <a:noFill/>
+            <a:ln>
+              <a:noFill/>
+            </a:ln>
+          </p:spPr>
+          <p:style>
+            <a:lnRef idx="2">
+              <a:schemeClr val="accent1">
+                <a:shade val="50000"/>
+              </a:schemeClr>
+            </a:lnRef>
+            <a:fillRef idx="1">
+              <a:schemeClr val="accent1"/>
+            </a:fillRef>
+            <a:effectRef idx="0">
+              <a:schemeClr val="accent1"/>
+            </a:effectRef>
+            <a:fontRef idx="minor">
+              <a:schemeClr val="lt1"/>
+            </a:fontRef>
+          </p:style>
+          <p:txBody>
+            <a:bodyPr rtlCol="0" anchor="ctr"/>
+            <a:lstStyle/>
+            <a:p>
+              <a:pPr algn="ctr"/>
+              <a:r>
+                <a:rPr lang="en-US" sz="1800" dirty="0" smtClean="0">
+                  <a:solidFill>
+                    <a:schemeClr val="accent5">
+                      <a:lumMod val="75000"/>
+                    </a:schemeClr>
+                  </a:solidFill>
+                  <a:latin typeface="BrownBagLunch" panose="02000603000000000000" pitchFamily="2" charset="0"/>
+                </a:rPr>
+                <a:t>PLEASE ROTATE SCREEN</a:t>
+              </a:r>
+              <a:endParaRPr lang="en-US" sz="1800" dirty="0">
+                <a:solidFill>
+                  <a:schemeClr val="accent5">
+                    <a:lumMod val="75000"/>
+                  </a:schemeClr>
+                </a:solidFill>
+                <a:latin typeface="BrownBagLunch" panose="02000603000000000000" pitchFamily="2" charset="0"/>
+              </a:endParaRPr>
+            </a:p>
+          </p:txBody>
+        </p:sp>
+        <p:grpSp>
+          <p:nvGrpSpPr>
+            <p:cNvPr id="2" name="Group 1"/>
+            <p:cNvGrpSpPr/>
+            <p:nvPr/>
+          </p:nvGrpSpPr>
+          <p:grpSpPr>
+            <a:xfrm>
+              <a:off x="20771692" y="4004124"/>
+              <a:ext cx="396810" cy="334654"/>
+              <a:chOff x="20771692" y="4010753"/>
+              <a:chExt cx="396810" cy="334654"/>
+            </a:xfrm>
+          </p:grpSpPr>
+          <p:sp>
+            <p:nvSpPr>
+              <p:cNvPr id="1261" name="Arc 1260"/>
+              <p:cNvSpPr/>
+              <p:nvPr/>
+            </p:nvSpPr>
+            <p:spPr>
+              <a:xfrm flipV="1">
+                <a:off x="20807252" y="4010753"/>
+                <a:ext cx="361250" cy="330850"/>
+              </a:xfrm>
+              <a:prstGeom prst="arc">
+                <a:avLst>
+                  <a:gd name="adj1" fmla="val 8593773"/>
+                  <a:gd name="adj2" fmla="val 16474770"/>
+                </a:avLst>
+              </a:prstGeom>
+              <a:noFill/>
+              <a:ln w="41275">
+                <a:solidFill>
+                  <a:schemeClr val="accent5">
+                    <a:lumMod val="75000"/>
+                  </a:schemeClr>
+                </a:solidFill>
+                <a:tailEnd type="triangle" w="med" len="med"/>
+              </a:ln>
+            </p:spPr>
+            <p:style>
+              <a:lnRef idx="2">
+                <a:schemeClr val="accent1">
+                  <a:shade val="50000"/>
+                </a:schemeClr>
+              </a:lnRef>
+              <a:fillRef idx="1">
+                <a:schemeClr val="accent1"/>
+              </a:fillRef>
+              <a:effectRef idx="0">
+                <a:schemeClr val="accent1"/>
+              </a:effectRef>
+              <a:fontRef idx="minor">
+                <a:schemeClr val="lt1"/>
+              </a:fontRef>
+            </p:style>
+            <p:txBody>
+              <a:bodyPr rtlCol="0" anchor="ctr"/>
+              <a:lstStyle/>
+              <a:p>
+                <a:pPr algn="ctr"/>
+                <a:endParaRPr lang="en-US">
+                  <a:solidFill>
+                    <a:schemeClr val="accent5">
+                      <a:lumMod val="75000"/>
+                    </a:schemeClr>
+                  </a:solidFill>
+                </a:endParaRPr>
+              </a:p>
+            </p:txBody>
+          </p:sp>
+          <p:sp>
+            <p:nvSpPr>
+              <p:cNvPr id="1468" name="Arc 1467"/>
+              <p:cNvSpPr/>
+              <p:nvPr/>
+            </p:nvSpPr>
+            <p:spPr>
+              <a:xfrm flipH="1">
+                <a:off x="20771692" y="4028265"/>
+                <a:ext cx="361250" cy="317142"/>
+              </a:xfrm>
+              <a:prstGeom prst="arc">
+                <a:avLst>
+                  <a:gd name="adj1" fmla="val 7997812"/>
+                  <a:gd name="adj2" fmla="val 17167420"/>
+                </a:avLst>
+              </a:prstGeom>
+              <a:noFill/>
+              <a:ln w="41275">
+                <a:solidFill>
+                  <a:schemeClr val="accent5">
+                    <a:lumMod val="75000"/>
+                  </a:schemeClr>
+                </a:solidFill>
+                <a:tailEnd type="triangle" w="med" len="med"/>
+              </a:ln>
+            </p:spPr>
+            <p:style>
+              <a:lnRef idx="2">
+                <a:schemeClr val="accent1">
+                  <a:shade val="50000"/>
+                </a:schemeClr>
+              </a:lnRef>
+              <a:fillRef idx="1">
+                <a:schemeClr val="accent1"/>
+              </a:fillRef>
+              <a:effectRef idx="0">
+                <a:schemeClr val="accent1"/>
+              </a:effectRef>
+              <a:fontRef idx="minor">
+                <a:schemeClr val="lt1"/>
+              </a:fontRef>
+            </p:style>
+            <p:txBody>
+              <a:bodyPr rtlCol="0" anchor="ctr"/>
+              <a:lstStyle/>
+              <a:p>
+                <a:pPr algn="ctr"/>
+                <a:endParaRPr lang="en-US">
+                  <a:solidFill>
+                    <a:schemeClr val="accent5">
+                      <a:lumMod val="75000"/>
+                    </a:schemeClr>
+                  </a:solidFill>
+                </a:endParaRPr>
+              </a:p>
+            </p:txBody>
+          </p:sp>
+        </p:grpSp>
+      </p:grpSp>
+      <p:grpSp>
+        <p:nvGrpSpPr>
+          <p:cNvPr id="1469" name="Group 1468"/>
+          <p:cNvGrpSpPr/>
+          <p:nvPr/>
+        </p:nvGrpSpPr>
+        <p:grpSpPr>
+          <a:xfrm>
+            <a:off x="20084758" y="2245949"/>
+            <a:ext cx="1402911" cy="970699"/>
+            <a:chOff x="20265805" y="3422704"/>
+            <a:chExt cx="1402911" cy="970699"/>
+          </a:xfrm>
+        </p:grpSpPr>
+        <p:sp>
+          <p:nvSpPr>
+            <p:cNvPr id="1470" name="Rectangle 1469"/>
+            <p:cNvSpPr/>
+            <p:nvPr/>
+          </p:nvSpPr>
+          <p:spPr>
+            <a:xfrm>
+              <a:off x="20325080" y="3422704"/>
+              <a:ext cx="1291558" cy="970699"/>
+            </a:xfrm>
+            <a:prstGeom prst="rect">
+              <a:avLst/>
+            </a:prstGeom>
+            <a:solidFill>
+              <a:schemeClr val="accent4">
+                <a:lumMod val="40000"/>
+                <a:lumOff val="60000"/>
+              </a:schemeClr>
+            </a:solidFill>
+            <a:ln w="22225">
+              <a:noFill/>
+            </a:ln>
+            <a:effectLst/>
+          </p:spPr>
+          <p:style>
+            <a:lnRef idx="2">
+              <a:schemeClr val="accent1">
+                <a:shade val="50000"/>
+              </a:schemeClr>
+            </a:lnRef>
+            <a:fillRef idx="1">
+              <a:schemeClr val="accent1"/>
+            </a:fillRef>
+            <a:effectRef idx="0">
+              <a:schemeClr val="accent1"/>
+            </a:effectRef>
+            <a:fontRef idx="minor">
+              <a:schemeClr val="lt1"/>
+            </a:fontRef>
+          </p:style>
+          <p:txBody>
+            <a:bodyPr rtlCol="0" anchor="ctr"/>
+            <a:lstStyle/>
+            <a:p>
+              <a:pPr algn="ctr"/>
+              <a:endParaRPr lang="en-US"/>
+            </a:p>
+          </p:txBody>
+        </p:sp>
+        <p:sp>
+          <p:nvSpPr>
+            <p:cNvPr id="1471" name="Rectangle 1470"/>
+            <p:cNvSpPr/>
+            <p:nvPr/>
+          </p:nvSpPr>
+          <p:spPr>
+            <a:xfrm>
+              <a:off x="20265805" y="3422704"/>
+              <a:ext cx="1402911" cy="440742"/>
+            </a:xfrm>
+            <a:prstGeom prst="rect">
+              <a:avLst/>
+            </a:prstGeom>
+            <a:noFill/>
+            <a:ln>
+              <a:noFill/>
+            </a:ln>
+          </p:spPr>
+          <p:style>
+            <a:lnRef idx="2">
+              <a:schemeClr val="accent1">
+                <a:shade val="50000"/>
+              </a:schemeClr>
+            </a:lnRef>
+            <a:fillRef idx="1">
+              <a:schemeClr val="accent1"/>
+            </a:fillRef>
+            <a:effectRef idx="0">
+              <a:schemeClr val="accent1"/>
+            </a:effectRef>
+            <a:fontRef idx="minor">
+              <a:schemeClr val="lt1"/>
+            </a:fontRef>
+          </p:style>
+          <p:txBody>
+            <a:bodyPr rtlCol="0" anchor="ctr"/>
+            <a:lstStyle/>
+            <a:p>
+              <a:pPr algn="ctr"/>
+              <a:r>
+                <a:rPr lang="en-US" sz="1800" dirty="0" smtClean="0">
+                  <a:solidFill>
+                    <a:schemeClr val="accent4">
+                      <a:lumMod val="75000"/>
+                    </a:schemeClr>
+                  </a:solidFill>
+                  <a:latin typeface="BrownBagLunch" panose="02000603000000000000" pitchFamily="2" charset="0"/>
+                </a:rPr>
+                <a:t>PLEASE ROTATE SCREEN</a:t>
+              </a:r>
+              <a:endParaRPr lang="en-US" sz="1800" dirty="0">
+                <a:solidFill>
+                  <a:schemeClr val="accent4">
+                    <a:lumMod val="75000"/>
+                  </a:schemeClr>
+                </a:solidFill>
+                <a:latin typeface="BrownBagLunch" panose="02000603000000000000" pitchFamily="2" charset="0"/>
+              </a:endParaRPr>
+            </a:p>
+          </p:txBody>
+        </p:sp>
+        <p:grpSp>
+          <p:nvGrpSpPr>
+            <p:cNvPr id="1472" name="Group 1471"/>
+            <p:cNvGrpSpPr/>
+            <p:nvPr/>
+          </p:nvGrpSpPr>
+          <p:grpSpPr>
+            <a:xfrm>
+              <a:off x="20771692" y="4004124"/>
+              <a:ext cx="396810" cy="334654"/>
+              <a:chOff x="20771692" y="4010753"/>
+              <a:chExt cx="396810" cy="334654"/>
+            </a:xfrm>
+          </p:grpSpPr>
+          <p:sp>
+            <p:nvSpPr>
+              <p:cNvPr id="1473" name="Arc 1472"/>
+              <p:cNvSpPr/>
+              <p:nvPr/>
+            </p:nvSpPr>
+            <p:spPr>
+              <a:xfrm flipV="1">
+                <a:off x="20807252" y="4010753"/>
+                <a:ext cx="361250" cy="330850"/>
+              </a:xfrm>
+              <a:prstGeom prst="arc">
+                <a:avLst>
+                  <a:gd name="adj1" fmla="val 8593773"/>
+                  <a:gd name="adj2" fmla="val 16474770"/>
+                </a:avLst>
+              </a:prstGeom>
+              <a:noFill/>
+              <a:ln w="41275">
+                <a:solidFill>
+                  <a:schemeClr val="accent4">
+                    <a:lumMod val="75000"/>
+                  </a:schemeClr>
+                </a:solidFill>
+                <a:tailEnd type="triangle" w="med" len="med"/>
+              </a:ln>
+            </p:spPr>
+            <p:style>
+              <a:lnRef idx="2">
+                <a:schemeClr val="accent1">
+                  <a:shade val="50000"/>
+                </a:schemeClr>
+              </a:lnRef>
+              <a:fillRef idx="1">
+                <a:schemeClr val="accent1"/>
+              </a:fillRef>
+              <a:effectRef idx="0">
+                <a:schemeClr val="accent1"/>
+              </a:effectRef>
+              <a:fontRef idx="minor">
+                <a:schemeClr val="lt1"/>
+              </a:fontRef>
+            </p:style>
+            <p:txBody>
+              <a:bodyPr rtlCol="0" anchor="ctr"/>
+              <a:lstStyle/>
+              <a:p>
+                <a:pPr algn="ctr"/>
+                <a:endParaRPr lang="en-US">
+                  <a:solidFill>
+                    <a:schemeClr val="lt1"/>
+                  </a:solidFill>
+                </a:endParaRPr>
+              </a:p>
+            </p:txBody>
+          </p:sp>
+          <p:sp>
+            <p:nvSpPr>
+              <p:cNvPr id="1474" name="Arc 1473"/>
+              <p:cNvSpPr/>
+              <p:nvPr/>
+            </p:nvSpPr>
+            <p:spPr>
+              <a:xfrm flipH="1">
+                <a:off x="20771692" y="4028265"/>
+                <a:ext cx="361250" cy="317142"/>
+              </a:xfrm>
+              <a:prstGeom prst="arc">
+                <a:avLst>
+                  <a:gd name="adj1" fmla="val 7997812"/>
+                  <a:gd name="adj2" fmla="val 17167420"/>
+                </a:avLst>
+              </a:prstGeom>
+              <a:noFill/>
+              <a:ln w="41275">
+                <a:solidFill>
+                  <a:schemeClr val="accent4">
+                    <a:lumMod val="75000"/>
+                  </a:schemeClr>
+                </a:solidFill>
+                <a:tailEnd type="triangle" w="med" len="med"/>
+              </a:ln>
+            </p:spPr>
+            <p:style>
+              <a:lnRef idx="2">
+                <a:schemeClr val="accent1">
+                  <a:shade val="50000"/>
+                </a:schemeClr>
+              </a:lnRef>
+              <a:fillRef idx="1">
+                <a:schemeClr val="accent1"/>
+              </a:fillRef>
+              <a:effectRef idx="0">
+                <a:schemeClr val="accent1"/>
+              </a:effectRef>
+              <a:fontRef idx="minor">
+                <a:schemeClr val="lt1"/>
+              </a:fontRef>
+            </p:style>
+            <p:txBody>
+              <a:bodyPr rtlCol="0" anchor="ctr"/>
+              <a:lstStyle/>
+              <a:p>
+                <a:pPr algn="ctr"/>
+                <a:endParaRPr lang="en-US">
+                  <a:solidFill>
+                    <a:schemeClr val="lt1"/>
+                  </a:solidFill>
+                </a:endParaRPr>
+              </a:p>
+            </p:txBody>
+          </p:sp>
+        </p:grpSp>
+      </p:grpSp>
+      <p:grpSp>
+        <p:nvGrpSpPr>
+          <p:cNvPr id="1475" name="Group 1474"/>
+          <p:cNvGrpSpPr/>
+          <p:nvPr/>
+        </p:nvGrpSpPr>
+        <p:grpSpPr>
+          <a:xfrm>
+            <a:off x="20082562" y="3325052"/>
+            <a:ext cx="1402911" cy="970699"/>
+            <a:chOff x="20265805" y="3422704"/>
+            <a:chExt cx="1402911" cy="970699"/>
+          </a:xfrm>
+        </p:grpSpPr>
+        <p:sp>
+          <p:nvSpPr>
+            <p:cNvPr id="1476" name="Rectangle 1475"/>
+            <p:cNvSpPr/>
+            <p:nvPr/>
+          </p:nvSpPr>
+          <p:spPr>
+            <a:xfrm>
+              <a:off x="20325080" y="3422704"/>
+              <a:ext cx="1291558" cy="970699"/>
+            </a:xfrm>
+            <a:prstGeom prst="rect">
+              <a:avLst/>
+            </a:prstGeom>
+            <a:solidFill>
+              <a:schemeClr val="accent2">
+                <a:lumMod val="40000"/>
+                <a:lumOff val="60000"/>
+              </a:schemeClr>
+            </a:solidFill>
+            <a:ln w="22225">
+              <a:noFill/>
+            </a:ln>
+            <a:effectLst/>
+          </p:spPr>
+          <p:style>
+            <a:lnRef idx="2">
+              <a:schemeClr val="accent1">
+                <a:shade val="50000"/>
+              </a:schemeClr>
+            </a:lnRef>
+            <a:fillRef idx="1">
+              <a:schemeClr val="accent1"/>
+            </a:fillRef>
+            <a:effectRef idx="0">
+              <a:schemeClr val="accent1"/>
+            </a:effectRef>
+            <a:fontRef idx="minor">
+              <a:schemeClr val="lt1"/>
+            </a:fontRef>
+          </p:style>
+          <p:txBody>
+            <a:bodyPr rtlCol="0" anchor="ctr"/>
+            <a:lstStyle/>
+            <a:p>
+              <a:pPr algn="ctr"/>
+              <a:endParaRPr lang="en-US"/>
+            </a:p>
+          </p:txBody>
+        </p:sp>
+        <p:sp>
+          <p:nvSpPr>
+            <p:cNvPr id="1477" name="Rectangle 1476"/>
+            <p:cNvSpPr/>
+            <p:nvPr/>
+          </p:nvSpPr>
+          <p:spPr>
+            <a:xfrm>
+              <a:off x="20265805" y="3422704"/>
+              <a:ext cx="1402911" cy="440742"/>
+            </a:xfrm>
+            <a:prstGeom prst="rect">
+              <a:avLst/>
+            </a:prstGeom>
+            <a:noFill/>
+            <a:ln>
+              <a:noFill/>
+            </a:ln>
+          </p:spPr>
+          <p:style>
+            <a:lnRef idx="2">
+              <a:schemeClr val="accent1">
+                <a:shade val="50000"/>
+              </a:schemeClr>
+            </a:lnRef>
+            <a:fillRef idx="1">
+              <a:schemeClr val="accent1"/>
+            </a:fillRef>
+            <a:effectRef idx="0">
+              <a:schemeClr val="accent1"/>
+            </a:effectRef>
+            <a:fontRef idx="minor">
+              <a:schemeClr val="lt1"/>
+            </a:fontRef>
+          </p:style>
+          <p:txBody>
+            <a:bodyPr rtlCol="0" anchor="ctr"/>
+            <a:lstStyle/>
+            <a:p>
+              <a:pPr algn="ctr"/>
+              <a:r>
+                <a:rPr lang="en-US" sz="1800" dirty="0" smtClean="0">
+                  <a:solidFill>
+                    <a:schemeClr val="accent2">
+                      <a:lumMod val="75000"/>
+                    </a:schemeClr>
+                  </a:solidFill>
+                  <a:latin typeface="BrownBagLunch" panose="02000603000000000000" pitchFamily="2" charset="0"/>
+                </a:rPr>
+                <a:t>PLEASE ROTATE SCREEN</a:t>
+              </a:r>
+              <a:endParaRPr lang="en-US" sz="1800" dirty="0">
+                <a:solidFill>
+                  <a:schemeClr val="accent2">
+                    <a:lumMod val="75000"/>
+                  </a:schemeClr>
+                </a:solidFill>
+                <a:latin typeface="BrownBagLunch" panose="02000603000000000000" pitchFamily="2" charset="0"/>
+              </a:endParaRPr>
+            </a:p>
+          </p:txBody>
+        </p:sp>
+        <p:grpSp>
+          <p:nvGrpSpPr>
+            <p:cNvPr id="1478" name="Group 1477"/>
+            <p:cNvGrpSpPr/>
+            <p:nvPr/>
+          </p:nvGrpSpPr>
+          <p:grpSpPr>
+            <a:xfrm>
+              <a:off x="20771692" y="4004124"/>
+              <a:ext cx="396810" cy="334654"/>
+              <a:chOff x="20771692" y="4010753"/>
+              <a:chExt cx="396810" cy="334654"/>
+            </a:xfrm>
+          </p:grpSpPr>
+          <p:sp>
+            <p:nvSpPr>
+              <p:cNvPr id="1482" name="Arc 1481"/>
+              <p:cNvSpPr/>
+              <p:nvPr/>
+            </p:nvSpPr>
+            <p:spPr>
+              <a:xfrm flipV="1">
+                <a:off x="20807252" y="4010753"/>
+                <a:ext cx="361250" cy="330850"/>
+              </a:xfrm>
+              <a:prstGeom prst="arc">
+                <a:avLst>
+                  <a:gd name="adj1" fmla="val 8593773"/>
+                  <a:gd name="adj2" fmla="val 16474770"/>
+                </a:avLst>
+              </a:prstGeom>
+              <a:noFill/>
+              <a:ln w="41275">
+                <a:solidFill>
+                  <a:schemeClr val="accent2">
+                    <a:lumMod val="75000"/>
+                  </a:schemeClr>
+                </a:solidFill>
+                <a:tailEnd type="triangle" w="med" len="med"/>
+              </a:ln>
+            </p:spPr>
+            <p:style>
+              <a:lnRef idx="2">
+                <a:schemeClr val="accent1">
+                  <a:shade val="50000"/>
+                </a:schemeClr>
+              </a:lnRef>
+              <a:fillRef idx="1">
+                <a:schemeClr val="accent1"/>
+              </a:fillRef>
+              <a:effectRef idx="0">
+                <a:schemeClr val="accent1"/>
+              </a:effectRef>
+              <a:fontRef idx="minor">
+                <a:schemeClr val="lt1"/>
+              </a:fontRef>
+            </p:style>
+            <p:txBody>
+              <a:bodyPr rtlCol="0" anchor="ctr"/>
+              <a:lstStyle/>
+              <a:p>
+                <a:pPr algn="ctr"/>
+                <a:endParaRPr lang="en-US">
+                  <a:solidFill>
+                    <a:schemeClr val="lt1"/>
+                  </a:solidFill>
+                </a:endParaRPr>
+              </a:p>
+            </p:txBody>
+          </p:sp>
+          <p:sp>
+            <p:nvSpPr>
+              <p:cNvPr id="1483" name="Arc 1482"/>
+              <p:cNvSpPr/>
+              <p:nvPr/>
+            </p:nvSpPr>
+            <p:spPr>
+              <a:xfrm flipH="1">
+                <a:off x="20771692" y="4028265"/>
+                <a:ext cx="361250" cy="317142"/>
+              </a:xfrm>
+              <a:prstGeom prst="arc">
+                <a:avLst>
+                  <a:gd name="adj1" fmla="val 7997812"/>
+                  <a:gd name="adj2" fmla="val 17167420"/>
+                </a:avLst>
+              </a:prstGeom>
+              <a:noFill/>
+              <a:ln w="41275">
+                <a:solidFill>
+                  <a:schemeClr val="accent2">
+                    <a:lumMod val="75000"/>
+                  </a:schemeClr>
+                </a:solidFill>
+                <a:tailEnd type="triangle" w="med" len="med"/>
+              </a:ln>
+            </p:spPr>
+            <p:style>
+              <a:lnRef idx="2">
+                <a:schemeClr val="accent1">
+                  <a:shade val="50000"/>
+                </a:schemeClr>
+              </a:lnRef>
+              <a:fillRef idx="1">
+                <a:schemeClr val="accent1"/>
+              </a:fillRef>
+              <a:effectRef idx="0">
+                <a:schemeClr val="accent1"/>
+              </a:effectRef>
+              <a:fontRef idx="minor">
+                <a:schemeClr val="lt1"/>
+              </a:fontRef>
+            </p:style>
+            <p:txBody>
+              <a:bodyPr rtlCol="0" anchor="ctr"/>
+              <a:lstStyle/>
+              <a:p>
+                <a:pPr algn="ctr"/>
+                <a:endParaRPr lang="en-US">
+                  <a:solidFill>
+                    <a:schemeClr val="lt1"/>
+                  </a:solidFill>
+                </a:endParaRPr>
+              </a:p>
+            </p:txBody>
+          </p:sp>
+        </p:grpSp>
+      </p:grpSp>
+      <p:grpSp>
+        <p:nvGrpSpPr>
+          <p:cNvPr id="1492" name="Group 1491"/>
+          <p:cNvGrpSpPr/>
+          <p:nvPr/>
+        </p:nvGrpSpPr>
+        <p:grpSpPr>
+          <a:xfrm>
+            <a:off x="21499578" y="2245949"/>
+            <a:ext cx="1402911" cy="970699"/>
+            <a:chOff x="20265805" y="3422704"/>
+            <a:chExt cx="1402911" cy="970699"/>
+          </a:xfrm>
+        </p:grpSpPr>
+        <p:sp>
+          <p:nvSpPr>
+            <p:cNvPr id="1494" name="Rectangle 1493"/>
+            <p:cNvSpPr/>
+            <p:nvPr/>
+          </p:nvSpPr>
+          <p:spPr>
+            <a:xfrm>
+              <a:off x="20325080" y="3422704"/>
+              <a:ext cx="1291558" cy="970699"/>
+            </a:xfrm>
+            <a:prstGeom prst="rect">
+              <a:avLst/>
+            </a:prstGeom>
+            <a:solidFill>
+              <a:srgbClr val="E0BFE3"/>
+            </a:solidFill>
+            <a:ln w="22225">
+              <a:noFill/>
+            </a:ln>
+            <a:effectLst/>
+          </p:spPr>
+          <p:style>
+            <a:lnRef idx="2">
+              <a:schemeClr val="accent1">
+                <a:shade val="50000"/>
+              </a:schemeClr>
+            </a:lnRef>
+            <a:fillRef idx="1">
+              <a:schemeClr val="accent1"/>
+            </a:fillRef>
+            <a:effectRef idx="0">
+              <a:schemeClr val="accent1"/>
+            </a:effectRef>
+            <a:fontRef idx="minor">
+              <a:schemeClr val="lt1"/>
+            </a:fontRef>
+          </p:style>
+          <p:txBody>
+            <a:bodyPr rtlCol="0" anchor="ctr"/>
+            <a:lstStyle/>
+            <a:p>
+              <a:pPr algn="ctr"/>
+              <a:endParaRPr lang="en-US"/>
+            </a:p>
+          </p:txBody>
+        </p:sp>
+        <p:sp>
+          <p:nvSpPr>
+            <p:cNvPr id="1496" name="Rectangle 1495"/>
+            <p:cNvSpPr/>
+            <p:nvPr/>
+          </p:nvSpPr>
+          <p:spPr>
+            <a:xfrm>
+              <a:off x="20265805" y="3422704"/>
+              <a:ext cx="1402911" cy="440742"/>
+            </a:xfrm>
+            <a:prstGeom prst="rect">
+              <a:avLst/>
+            </a:prstGeom>
+            <a:noFill/>
+            <a:ln>
+              <a:noFill/>
+            </a:ln>
+          </p:spPr>
+          <p:style>
+            <a:lnRef idx="2">
+              <a:schemeClr val="accent1">
+                <a:shade val="50000"/>
+              </a:schemeClr>
+            </a:lnRef>
+            <a:fillRef idx="1">
+              <a:schemeClr val="accent1"/>
+            </a:fillRef>
+            <a:effectRef idx="0">
+              <a:schemeClr val="accent1"/>
+            </a:effectRef>
+            <a:fontRef idx="minor">
+              <a:schemeClr val="lt1"/>
+            </a:fontRef>
+          </p:style>
+          <p:txBody>
+            <a:bodyPr rtlCol="0" anchor="ctr"/>
+            <a:lstStyle/>
+            <a:p>
+              <a:pPr algn="ctr"/>
+              <a:r>
+                <a:rPr lang="en-US" sz="1800" dirty="0" smtClean="0">
+                  <a:solidFill>
+                    <a:srgbClr val="643282"/>
+                  </a:solidFill>
+                  <a:latin typeface="BrownBagLunch" panose="02000603000000000000" pitchFamily="2" charset="0"/>
+                </a:rPr>
+                <a:t>PLEASE ROTATE SCREEN</a:t>
+              </a:r>
+              <a:endParaRPr lang="en-US" sz="1800" dirty="0">
+                <a:solidFill>
+                  <a:srgbClr val="643282"/>
+                </a:solidFill>
+                <a:latin typeface="BrownBagLunch" panose="02000603000000000000" pitchFamily="2" charset="0"/>
+              </a:endParaRPr>
+            </a:p>
+          </p:txBody>
+        </p:sp>
+        <p:grpSp>
+          <p:nvGrpSpPr>
+            <p:cNvPr id="1519" name="Group 1518"/>
+            <p:cNvGrpSpPr/>
+            <p:nvPr/>
+          </p:nvGrpSpPr>
+          <p:grpSpPr>
+            <a:xfrm>
+              <a:off x="20771692" y="4004124"/>
+              <a:ext cx="396810" cy="334654"/>
+              <a:chOff x="20771692" y="4010753"/>
+              <a:chExt cx="396810" cy="334654"/>
+            </a:xfrm>
+          </p:grpSpPr>
+          <p:sp>
+            <p:nvSpPr>
+              <p:cNvPr id="1521" name="Arc 1520"/>
+              <p:cNvSpPr/>
+              <p:nvPr/>
+            </p:nvSpPr>
+            <p:spPr>
+              <a:xfrm flipV="1">
+                <a:off x="20807252" y="4010753"/>
+                <a:ext cx="361250" cy="330850"/>
+              </a:xfrm>
+              <a:prstGeom prst="arc">
+                <a:avLst>
+                  <a:gd name="adj1" fmla="val 8593773"/>
+                  <a:gd name="adj2" fmla="val 16474770"/>
+                </a:avLst>
+              </a:prstGeom>
+              <a:noFill/>
+              <a:ln w="41275">
+                <a:solidFill>
+                  <a:srgbClr val="643282"/>
+                </a:solidFill>
+                <a:tailEnd type="triangle" w="med" len="med"/>
+              </a:ln>
+            </p:spPr>
+            <p:style>
+              <a:lnRef idx="2">
+                <a:schemeClr val="accent1">
+                  <a:shade val="50000"/>
+                </a:schemeClr>
+              </a:lnRef>
+              <a:fillRef idx="1">
+                <a:schemeClr val="accent1"/>
+              </a:fillRef>
+              <a:effectRef idx="0">
+                <a:schemeClr val="accent1"/>
+              </a:effectRef>
+              <a:fontRef idx="minor">
+                <a:schemeClr val="lt1"/>
+              </a:fontRef>
+            </p:style>
+            <p:txBody>
+              <a:bodyPr rtlCol="0" anchor="ctr"/>
+              <a:lstStyle/>
+              <a:p>
+                <a:pPr algn="ctr"/>
+                <a:endParaRPr lang="en-US">
+                  <a:solidFill>
+                    <a:schemeClr val="lt1"/>
+                  </a:solidFill>
+                </a:endParaRPr>
+              </a:p>
+            </p:txBody>
+          </p:sp>
+          <p:sp>
+            <p:nvSpPr>
+              <p:cNvPr id="1523" name="Arc 1522"/>
+              <p:cNvSpPr/>
+              <p:nvPr/>
+            </p:nvSpPr>
+            <p:spPr>
+              <a:xfrm flipH="1">
+                <a:off x="20771692" y="4028265"/>
+                <a:ext cx="361250" cy="317142"/>
+              </a:xfrm>
+              <a:prstGeom prst="arc">
+                <a:avLst>
+                  <a:gd name="adj1" fmla="val 7997812"/>
+                  <a:gd name="adj2" fmla="val 17167420"/>
+                </a:avLst>
+              </a:prstGeom>
+              <a:noFill/>
+              <a:ln w="41275">
+                <a:solidFill>
+                  <a:srgbClr val="643282"/>
+                </a:solidFill>
+                <a:tailEnd type="triangle" w="med" len="med"/>
+              </a:ln>
+            </p:spPr>
+            <p:style>
+              <a:lnRef idx="2">
+                <a:schemeClr val="accent1">
+                  <a:shade val="50000"/>
+                </a:schemeClr>
+              </a:lnRef>
+              <a:fillRef idx="1">
+                <a:schemeClr val="accent1"/>
+              </a:fillRef>
+              <a:effectRef idx="0">
+                <a:schemeClr val="accent1"/>
+              </a:effectRef>
+              <a:fontRef idx="minor">
+                <a:schemeClr val="lt1"/>
+              </a:fontRef>
+            </p:style>
+            <p:txBody>
+              <a:bodyPr rtlCol="0" anchor="ctr"/>
+              <a:lstStyle/>
+              <a:p>
+                <a:pPr algn="ctr"/>
+                <a:endParaRPr lang="en-US">
+                  <a:solidFill>
+                    <a:schemeClr val="lt1"/>
+                  </a:solidFill>
+                </a:endParaRPr>
+              </a:p>
+            </p:txBody>
+          </p:sp>
+        </p:grpSp>
+      </p:grpSp>
+      <p:grpSp>
+        <p:nvGrpSpPr>
+          <p:cNvPr id="1524" name="Group 1523"/>
+          <p:cNvGrpSpPr/>
+          <p:nvPr/>
+        </p:nvGrpSpPr>
+        <p:grpSpPr>
+          <a:xfrm>
+            <a:off x="21504553" y="3327874"/>
+            <a:ext cx="1402911" cy="970699"/>
+            <a:chOff x="20265805" y="3422704"/>
+            <a:chExt cx="1402911" cy="970699"/>
+          </a:xfrm>
+        </p:grpSpPr>
+        <p:sp>
+          <p:nvSpPr>
+            <p:cNvPr id="1530" name="Rectangle 1529"/>
+            <p:cNvSpPr/>
+            <p:nvPr/>
+          </p:nvSpPr>
+          <p:spPr>
+            <a:xfrm>
+              <a:off x="20325080" y="3422704"/>
+              <a:ext cx="1291558" cy="970699"/>
+            </a:xfrm>
+            <a:prstGeom prst="rect">
+              <a:avLst/>
+            </a:prstGeom>
+            <a:solidFill>
+              <a:srgbClr val="F9B7B5"/>
+            </a:solidFill>
+            <a:ln w="22225">
+              <a:noFill/>
+            </a:ln>
+            <a:effectLst/>
+          </p:spPr>
+          <p:style>
+            <a:lnRef idx="2">
+              <a:schemeClr val="accent1">
+                <a:shade val="50000"/>
+              </a:schemeClr>
+            </a:lnRef>
+            <a:fillRef idx="1">
+              <a:schemeClr val="accent1"/>
+            </a:fillRef>
+            <a:effectRef idx="0">
+              <a:schemeClr val="accent1"/>
+            </a:effectRef>
+            <a:fontRef idx="minor">
+              <a:schemeClr val="lt1"/>
+            </a:fontRef>
+          </p:style>
+          <p:txBody>
+            <a:bodyPr rtlCol="0" anchor="ctr"/>
+            <a:lstStyle/>
+            <a:p>
+              <a:pPr algn="ctr"/>
+              <a:endParaRPr lang="en-US"/>
+            </a:p>
+          </p:txBody>
+        </p:sp>
+        <p:sp>
+          <p:nvSpPr>
+            <p:cNvPr id="1531" name="Rectangle 1530"/>
+            <p:cNvSpPr/>
+            <p:nvPr/>
+          </p:nvSpPr>
+          <p:spPr>
+            <a:xfrm>
+              <a:off x="20265805" y="3422704"/>
+              <a:ext cx="1402911" cy="440742"/>
+            </a:xfrm>
+            <a:prstGeom prst="rect">
+              <a:avLst/>
+            </a:prstGeom>
+            <a:noFill/>
+            <a:ln>
+              <a:noFill/>
+            </a:ln>
+          </p:spPr>
+          <p:style>
+            <a:lnRef idx="2">
+              <a:schemeClr val="accent1">
+                <a:shade val="50000"/>
+              </a:schemeClr>
+            </a:lnRef>
+            <a:fillRef idx="1">
+              <a:schemeClr val="accent1"/>
+            </a:fillRef>
+            <a:effectRef idx="0">
+              <a:schemeClr val="accent1"/>
+            </a:effectRef>
+            <a:fontRef idx="minor">
+              <a:schemeClr val="lt1"/>
+            </a:fontRef>
+          </p:style>
+          <p:txBody>
+            <a:bodyPr rtlCol="0" anchor="ctr"/>
+            <a:lstStyle/>
+            <a:p>
+              <a:pPr algn="ctr"/>
+              <a:r>
+                <a:rPr lang="en-US" sz="1800" dirty="0" smtClean="0">
+                  <a:solidFill>
+                    <a:srgbClr val="D93427"/>
+                  </a:solidFill>
+                  <a:latin typeface="BrownBagLunch" panose="02000603000000000000" pitchFamily="2" charset="0"/>
+                </a:rPr>
+                <a:t>PLEASE ROTATE SCREEN</a:t>
+              </a:r>
+              <a:endParaRPr lang="en-US" sz="1800" dirty="0">
+                <a:solidFill>
+                  <a:srgbClr val="D93427"/>
+                </a:solidFill>
+                <a:latin typeface="BrownBagLunch" panose="02000603000000000000" pitchFamily="2" charset="0"/>
+              </a:endParaRPr>
+            </a:p>
+          </p:txBody>
+        </p:sp>
+        <p:grpSp>
+          <p:nvGrpSpPr>
+            <p:cNvPr id="1563" name="Group 1562"/>
+            <p:cNvGrpSpPr/>
+            <p:nvPr/>
+          </p:nvGrpSpPr>
+          <p:grpSpPr>
+            <a:xfrm>
+              <a:off x="20771692" y="4004124"/>
+              <a:ext cx="396810" cy="334654"/>
+              <a:chOff x="20771692" y="4010753"/>
+              <a:chExt cx="396810" cy="334654"/>
+            </a:xfrm>
+          </p:grpSpPr>
+          <p:sp>
+            <p:nvSpPr>
+              <p:cNvPr id="1564" name="Arc 1563"/>
+              <p:cNvSpPr/>
+              <p:nvPr/>
+            </p:nvSpPr>
+            <p:spPr>
+              <a:xfrm flipV="1">
+                <a:off x="20807252" y="4010753"/>
+                <a:ext cx="361250" cy="330850"/>
+              </a:xfrm>
+              <a:prstGeom prst="arc">
+                <a:avLst>
+                  <a:gd name="adj1" fmla="val 8593773"/>
+                  <a:gd name="adj2" fmla="val 16474770"/>
+                </a:avLst>
+              </a:prstGeom>
+              <a:noFill/>
+              <a:ln w="41275">
+                <a:solidFill>
+                  <a:srgbClr val="D93427"/>
+                </a:solidFill>
+                <a:tailEnd type="triangle" w="med" len="med"/>
+              </a:ln>
+            </p:spPr>
+            <p:style>
+              <a:lnRef idx="2">
+                <a:schemeClr val="accent1">
+                  <a:shade val="50000"/>
+                </a:schemeClr>
+              </a:lnRef>
+              <a:fillRef idx="1">
+                <a:schemeClr val="accent1"/>
+              </a:fillRef>
+              <a:effectRef idx="0">
+                <a:schemeClr val="accent1"/>
+              </a:effectRef>
+              <a:fontRef idx="minor">
+                <a:schemeClr val="lt1"/>
+              </a:fontRef>
+            </p:style>
+            <p:txBody>
+              <a:bodyPr rtlCol="0" anchor="ctr"/>
+              <a:lstStyle/>
+              <a:p>
+                <a:pPr algn="ctr"/>
+                <a:endParaRPr lang="en-US">
+                  <a:solidFill>
+                    <a:schemeClr val="lt1"/>
+                  </a:solidFill>
+                </a:endParaRPr>
+              </a:p>
+            </p:txBody>
+          </p:sp>
+          <p:sp>
+            <p:nvSpPr>
+              <p:cNvPr id="1565" name="Arc 1564"/>
+              <p:cNvSpPr/>
+              <p:nvPr/>
+            </p:nvSpPr>
+            <p:spPr>
+              <a:xfrm flipH="1">
+                <a:off x="20771692" y="4028265"/>
+                <a:ext cx="361250" cy="317142"/>
+              </a:xfrm>
+              <a:prstGeom prst="arc">
+                <a:avLst>
+                  <a:gd name="adj1" fmla="val 7997812"/>
+                  <a:gd name="adj2" fmla="val 17167420"/>
+                </a:avLst>
+              </a:prstGeom>
+              <a:noFill/>
+              <a:ln w="41275">
+                <a:solidFill>
+                  <a:srgbClr val="D93427"/>
+                </a:solidFill>
+                <a:tailEnd type="triangle" w="med" len="med"/>
+              </a:ln>
+            </p:spPr>
+            <p:style>
+              <a:lnRef idx="2">
+                <a:schemeClr val="accent1">
+                  <a:shade val="50000"/>
+                </a:schemeClr>
+              </a:lnRef>
+              <a:fillRef idx="1">
+                <a:schemeClr val="accent1"/>
+              </a:fillRef>
+              <a:effectRef idx="0">
+                <a:schemeClr val="accent1"/>
+              </a:effectRef>
+              <a:fontRef idx="minor">
+                <a:schemeClr val="lt1"/>
+              </a:fontRef>
+            </p:style>
+            <p:txBody>
+              <a:bodyPr rtlCol="0" anchor="ctr"/>
+              <a:lstStyle/>
+              <a:p>
+                <a:pPr algn="ctr"/>
+                <a:endParaRPr lang="en-US">
+                  <a:solidFill>
+                    <a:schemeClr val="lt1"/>
+                  </a:solidFill>
+                </a:endParaRPr>
+              </a:p>
+            </p:txBody>
+          </p:sp>
+        </p:grpSp>
+      </p:grpSp>
+      <p:grpSp>
+        <p:nvGrpSpPr>
+          <p:cNvPr id="1566" name="Group 1565"/>
+          <p:cNvGrpSpPr/>
+          <p:nvPr/>
+        </p:nvGrpSpPr>
+        <p:grpSpPr>
+          <a:xfrm>
+            <a:off x="21499578" y="1142556"/>
+            <a:ext cx="1402911" cy="970699"/>
+            <a:chOff x="20265805" y="3422704"/>
+            <a:chExt cx="1402911" cy="970699"/>
+          </a:xfrm>
+        </p:grpSpPr>
+        <p:sp>
+          <p:nvSpPr>
+            <p:cNvPr id="1567" name="Rectangle 1566"/>
+            <p:cNvSpPr/>
+            <p:nvPr/>
+          </p:nvSpPr>
+          <p:spPr>
+            <a:xfrm>
+              <a:off x="20325080" y="3422704"/>
+              <a:ext cx="1291558" cy="970699"/>
+            </a:xfrm>
+            <a:prstGeom prst="rect">
+              <a:avLst/>
+            </a:prstGeom>
+            <a:solidFill>
+              <a:schemeClr val="accent6">
+                <a:lumMod val="40000"/>
+                <a:lumOff val="60000"/>
+              </a:schemeClr>
+            </a:solidFill>
+            <a:ln w="22225">
+              <a:noFill/>
+            </a:ln>
+            <a:effectLst/>
+          </p:spPr>
+          <p:style>
+            <a:lnRef idx="2">
+              <a:schemeClr val="accent1">
+                <a:shade val="50000"/>
+              </a:schemeClr>
+            </a:lnRef>
+            <a:fillRef idx="1">
+              <a:schemeClr val="accent1"/>
+            </a:fillRef>
+            <a:effectRef idx="0">
+              <a:schemeClr val="accent1"/>
+            </a:effectRef>
+            <a:fontRef idx="minor">
+              <a:schemeClr val="lt1"/>
+            </a:fontRef>
+          </p:style>
+          <p:txBody>
+            <a:bodyPr rtlCol="0" anchor="ctr"/>
+            <a:lstStyle/>
+            <a:p>
+              <a:pPr algn="ctr"/>
+              <a:endParaRPr lang="en-US"/>
+            </a:p>
+          </p:txBody>
+        </p:sp>
+        <p:sp>
+          <p:nvSpPr>
+            <p:cNvPr id="1568" name="Rectangle 1567"/>
+            <p:cNvSpPr/>
+            <p:nvPr/>
+          </p:nvSpPr>
+          <p:spPr>
+            <a:xfrm>
+              <a:off x="20265805" y="3422704"/>
+              <a:ext cx="1402911" cy="440742"/>
+            </a:xfrm>
+            <a:prstGeom prst="rect">
+              <a:avLst/>
+            </a:prstGeom>
+            <a:noFill/>
+            <a:ln>
+              <a:noFill/>
+            </a:ln>
+          </p:spPr>
+          <p:style>
+            <a:lnRef idx="2">
+              <a:schemeClr val="accent1">
+                <a:shade val="50000"/>
+              </a:schemeClr>
+            </a:lnRef>
+            <a:fillRef idx="1">
+              <a:schemeClr val="accent1"/>
+            </a:fillRef>
+            <a:effectRef idx="0">
+              <a:schemeClr val="accent1"/>
+            </a:effectRef>
+            <a:fontRef idx="minor">
+              <a:schemeClr val="lt1"/>
+            </a:fontRef>
+          </p:style>
+          <p:txBody>
+            <a:bodyPr rtlCol="0" anchor="ctr"/>
+            <a:lstStyle/>
+            <a:p>
+              <a:pPr algn="ctr"/>
+              <a:r>
+                <a:rPr lang="en-US" sz="1800" dirty="0" smtClean="0">
+                  <a:solidFill>
+                    <a:schemeClr val="accent6">
+                      <a:lumMod val="75000"/>
+                    </a:schemeClr>
+                  </a:solidFill>
+                  <a:latin typeface="BrownBagLunch" panose="02000603000000000000" pitchFamily="2" charset="0"/>
+                </a:rPr>
+                <a:t>PLEASE ROTATE SCREEN</a:t>
+              </a:r>
+              <a:endParaRPr lang="en-US" sz="1800" dirty="0">
+                <a:solidFill>
+                  <a:schemeClr val="accent6">
+                    <a:lumMod val="75000"/>
+                  </a:schemeClr>
+                </a:solidFill>
+                <a:latin typeface="BrownBagLunch" panose="02000603000000000000" pitchFamily="2" charset="0"/>
+              </a:endParaRPr>
+            </a:p>
+          </p:txBody>
+        </p:sp>
+        <p:grpSp>
+          <p:nvGrpSpPr>
+            <p:cNvPr id="1569" name="Group 1568"/>
+            <p:cNvGrpSpPr/>
+            <p:nvPr/>
+          </p:nvGrpSpPr>
+          <p:grpSpPr>
+            <a:xfrm>
+              <a:off x="20771692" y="4004124"/>
+              <a:ext cx="396810" cy="334654"/>
+              <a:chOff x="20771692" y="4010753"/>
+              <a:chExt cx="396810" cy="334654"/>
+            </a:xfrm>
+          </p:grpSpPr>
+          <p:sp>
+            <p:nvSpPr>
+              <p:cNvPr id="1570" name="Arc 1569"/>
+              <p:cNvSpPr/>
+              <p:nvPr/>
+            </p:nvSpPr>
+            <p:spPr>
+              <a:xfrm flipV="1">
+                <a:off x="20807252" y="4010753"/>
+                <a:ext cx="361250" cy="330850"/>
+              </a:xfrm>
+              <a:prstGeom prst="arc">
+                <a:avLst>
+                  <a:gd name="adj1" fmla="val 8593773"/>
+                  <a:gd name="adj2" fmla="val 16474770"/>
+                </a:avLst>
+              </a:prstGeom>
+              <a:noFill/>
+              <a:ln w="41275">
+                <a:solidFill>
+                  <a:schemeClr val="accent6">
+                    <a:lumMod val="75000"/>
+                  </a:schemeClr>
+                </a:solidFill>
+                <a:tailEnd type="triangle" w="med" len="med"/>
+              </a:ln>
+            </p:spPr>
+            <p:style>
+              <a:lnRef idx="2">
+                <a:schemeClr val="accent1">
+                  <a:shade val="50000"/>
+                </a:schemeClr>
+              </a:lnRef>
+              <a:fillRef idx="1">
+                <a:schemeClr val="accent1"/>
+              </a:fillRef>
+              <a:effectRef idx="0">
+                <a:schemeClr val="accent1"/>
+              </a:effectRef>
+              <a:fontRef idx="minor">
+                <a:schemeClr val="lt1"/>
+              </a:fontRef>
+            </p:style>
+            <p:txBody>
+              <a:bodyPr rtlCol="0" anchor="ctr"/>
+              <a:lstStyle/>
+              <a:p>
+                <a:pPr algn="ctr"/>
+                <a:endParaRPr lang="en-US">
+                  <a:solidFill>
+                    <a:schemeClr val="lt1"/>
+                  </a:solidFill>
+                </a:endParaRPr>
+              </a:p>
+            </p:txBody>
+          </p:sp>
+          <p:sp>
+            <p:nvSpPr>
+              <p:cNvPr id="1571" name="Arc 1570"/>
+              <p:cNvSpPr/>
+              <p:nvPr/>
+            </p:nvSpPr>
+            <p:spPr>
+              <a:xfrm flipH="1">
+                <a:off x="20771692" y="4028265"/>
+                <a:ext cx="361250" cy="317142"/>
+              </a:xfrm>
+              <a:prstGeom prst="arc">
+                <a:avLst>
+                  <a:gd name="adj1" fmla="val 7997812"/>
+                  <a:gd name="adj2" fmla="val 17167420"/>
+                </a:avLst>
+              </a:prstGeom>
+              <a:noFill/>
+              <a:ln w="41275">
+                <a:solidFill>
+                  <a:schemeClr val="accent6">
+                    <a:lumMod val="75000"/>
+                  </a:schemeClr>
+                </a:solidFill>
+                <a:tailEnd type="triangle" w="med" len="med"/>
+              </a:ln>
+            </p:spPr>
+            <p:style>
+              <a:lnRef idx="2">
+                <a:schemeClr val="accent1">
+                  <a:shade val="50000"/>
+                </a:schemeClr>
+              </a:lnRef>
+              <a:fillRef idx="1">
+                <a:schemeClr val="accent1"/>
+              </a:fillRef>
+              <a:effectRef idx="0">
+                <a:schemeClr val="accent1"/>
+              </a:effectRef>
+              <a:fontRef idx="minor">
+                <a:schemeClr val="lt1"/>
+              </a:fontRef>
+            </p:style>
+            <p:txBody>
+              <a:bodyPr rtlCol="0" anchor="ctr"/>
+              <a:lstStyle/>
+              <a:p>
+                <a:pPr algn="ctr"/>
+                <a:endParaRPr lang="en-US">
+                  <a:solidFill>
+                    <a:schemeClr val="lt1"/>
+                  </a:solidFill>
+                </a:endParaRPr>
+              </a:p>
+            </p:txBody>
+          </p:sp>
+        </p:grpSp>
+      </p:grpSp>
+      <p:grpSp>
+        <p:nvGrpSpPr>
+          <p:cNvPr id="1575" name="Group 1574"/>
+          <p:cNvGrpSpPr/>
+          <p:nvPr/>
+        </p:nvGrpSpPr>
+        <p:grpSpPr>
+          <a:xfrm>
+            <a:off x="19895266" y="4430492"/>
+            <a:ext cx="1540550" cy="905375"/>
+            <a:chOff x="20265805" y="3422703"/>
+            <a:chExt cx="1540550" cy="744668"/>
+          </a:xfrm>
+        </p:grpSpPr>
+        <p:sp>
+          <p:nvSpPr>
+            <p:cNvPr id="1576" name="Rectangle 1575"/>
+            <p:cNvSpPr/>
+            <p:nvPr/>
+          </p:nvSpPr>
+          <p:spPr>
+            <a:xfrm>
+              <a:off x="20325079" y="3422705"/>
+              <a:ext cx="1417776" cy="744666"/>
+            </a:xfrm>
+            <a:prstGeom prst="rect">
+              <a:avLst/>
+            </a:prstGeom>
+            <a:solidFill>
+              <a:schemeClr val="accent5">
+                <a:lumMod val="40000"/>
+                <a:lumOff val="60000"/>
+              </a:schemeClr>
+            </a:solidFill>
+            <a:ln w="22225">
+              <a:noFill/>
+            </a:ln>
+            <a:effectLst/>
+          </p:spPr>
+          <p:style>
+            <a:lnRef idx="2">
+              <a:schemeClr val="accent1">
+                <a:shade val="50000"/>
+              </a:schemeClr>
+            </a:lnRef>
+            <a:fillRef idx="1">
+              <a:schemeClr val="accent1"/>
+            </a:fillRef>
+            <a:effectRef idx="0">
+              <a:schemeClr val="accent1"/>
+            </a:effectRef>
+            <a:fontRef idx="minor">
+              <a:schemeClr val="lt1"/>
+            </a:fontRef>
+          </p:style>
+          <p:txBody>
+            <a:bodyPr rtlCol="0" anchor="ctr"/>
+            <a:lstStyle/>
+            <a:p>
+              <a:pPr algn="ctr"/>
+              <a:endParaRPr lang="en-US">
+                <a:solidFill>
+                  <a:schemeClr val="accent5">
+                    <a:lumMod val="75000"/>
+                  </a:schemeClr>
+                </a:solidFill>
+              </a:endParaRPr>
+            </a:p>
+          </p:txBody>
+        </p:sp>
+        <p:sp>
+          <p:nvSpPr>
+            <p:cNvPr id="1577" name="Rectangle 1576"/>
+            <p:cNvSpPr/>
+            <p:nvPr/>
+          </p:nvSpPr>
+          <p:spPr>
+            <a:xfrm>
+              <a:off x="20265805" y="3422703"/>
+              <a:ext cx="1540550" cy="666471"/>
+            </a:xfrm>
+            <a:prstGeom prst="rect">
+              <a:avLst/>
+            </a:prstGeom>
+            <a:noFill/>
+            <a:ln>
+              <a:noFill/>
+            </a:ln>
+          </p:spPr>
+          <p:style>
+            <a:lnRef idx="2">
+              <a:schemeClr val="accent1">
+                <a:shade val="50000"/>
+              </a:schemeClr>
+            </a:lnRef>
+            <a:fillRef idx="1">
+              <a:schemeClr val="accent1"/>
+            </a:fillRef>
+            <a:effectRef idx="0">
+              <a:schemeClr val="accent1"/>
+            </a:effectRef>
+            <a:fontRef idx="minor">
+              <a:schemeClr val="lt1"/>
+            </a:fontRef>
+          </p:style>
+          <p:txBody>
+            <a:bodyPr rtlCol="0" anchor="ctr"/>
+            <a:lstStyle/>
+            <a:p>
+              <a:pPr algn="ctr"/>
+              <a:r>
+                <a:rPr lang="en-US" sz="1800" dirty="0" smtClean="0">
+                  <a:solidFill>
+                    <a:schemeClr val="accent5">
+                      <a:lumMod val="75000"/>
+                    </a:schemeClr>
+                  </a:solidFill>
+                  <a:latin typeface="BrownBagLunch" panose="02000603000000000000" pitchFamily="2" charset="0"/>
+                </a:rPr>
+                <a:t>SCREEN TOO SMALL FOR THIS APPLICATION</a:t>
+              </a:r>
+              <a:endParaRPr lang="en-US" sz="1800" dirty="0">
+                <a:solidFill>
+                  <a:schemeClr val="accent5">
+                    <a:lumMod val="75000"/>
+                  </a:schemeClr>
+                </a:solidFill>
+                <a:latin typeface="BrownBagLunch" panose="02000603000000000000" pitchFamily="2" charset="0"/>
+              </a:endParaRPr>
+            </a:p>
+          </p:txBody>
+        </p:sp>
+      </p:grpSp>
+      <p:grpSp>
+        <p:nvGrpSpPr>
+          <p:cNvPr id="1671" name="Group 1670"/>
+          <p:cNvGrpSpPr/>
+          <p:nvPr/>
+        </p:nvGrpSpPr>
+        <p:grpSpPr>
+          <a:xfrm>
+            <a:off x="21527736" y="4436057"/>
+            <a:ext cx="1540550" cy="905375"/>
+            <a:chOff x="20265805" y="3422703"/>
+            <a:chExt cx="1540550" cy="744668"/>
+          </a:xfrm>
+        </p:grpSpPr>
+        <p:sp>
+          <p:nvSpPr>
+            <p:cNvPr id="1672" name="Rectangle 1671"/>
+            <p:cNvSpPr/>
+            <p:nvPr/>
+          </p:nvSpPr>
+          <p:spPr>
+            <a:xfrm>
+              <a:off x="20325079" y="3422705"/>
+              <a:ext cx="1417776" cy="744666"/>
+            </a:xfrm>
+            <a:prstGeom prst="rect">
+              <a:avLst/>
+            </a:prstGeom>
+            <a:solidFill>
+              <a:schemeClr val="accent6">
+                <a:lumMod val="40000"/>
+                <a:lumOff val="60000"/>
+              </a:schemeClr>
+            </a:solidFill>
+            <a:ln w="22225">
+              <a:noFill/>
+            </a:ln>
+            <a:effectLst/>
+          </p:spPr>
+          <p:style>
+            <a:lnRef idx="2">
+              <a:schemeClr val="accent1">
+                <a:shade val="50000"/>
+              </a:schemeClr>
+            </a:lnRef>
+            <a:fillRef idx="1">
+              <a:schemeClr val="accent1"/>
+            </a:fillRef>
+            <a:effectRef idx="0">
+              <a:schemeClr val="accent1"/>
+            </a:effectRef>
+            <a:fontRef idx="minor">
+              <a:schemeClr val="lt1"/>
+            </a:fontRef>
+          </p:style>
+          <p:txBody>
+            <a:bodyPr rtlCol="0" anchor="ctr"/>
+            <a:lstStyle/>
+            <a:p>
+              <a:pPr algn="ctr"/>
+              <a:endParaRPr lang="en-US">
+                <a:solidFill>
+                  <a:schemeClr val="accent6">
+                    <a:lumMod val="75000"/>
+                  </a:schemeClr>
+                </a:solidFill>
+              </a:endParaRPr>
+            </a:p>
+          </p:txBody>
+        </p:sp>
+        <p:sp>
+          <p:nvSpPr>
+            <p:cNvPr id="1673" name="Rectangle 1672"/>
+            <p:cNvSpPr/>
+            <p:nvPr/>
+          </p:nvSpPr>
+          <p:spPr>
+            <a:xfrm>
+              <a:off x="20265805" y="3422703"/>
+              <a:ext cx="1540550" cy="666471"/>
+            </a:xfrm>
+            <a:prstGeom prst="rect">
+              <a:avLst/>
+            </a:prstGeom>
+            <a:noFill/>
+            <a:ln>
+              <a:noFill/>
+            </a:ln>
+          </p:spPr>
+          <p:style>
+            <a:lnRef idx="2">
+              <a:schemeClr val="accent1">
+                <a:shade val="50000"/>
+              </a:schemeClr>
+            </a:lnRef>
+            <a:fillRef idx="1">
+              <a:schemeClr val="accent1"/>
+            </a:fillRef>
+            <a:effectRef idx="0">
+              <a:schemeClr val="accent1"/>
+            </a:effectRef>
+            <a:fontRef idx="minor">
+              <a:schemeClr val="lt1"/>
+            </a:fontRef>
+          </p:style>
+          <p:txBody>
+            <a:bodyPr rtlCol="0" anchor="ctr"/>
+            <a:lstStyle/>
+            <a:p>
+              <a:pPr algn="ctr"/>
+              <a:r>
+                <a:rPr lang="en-US" sz="1800" dirty="0" smtClean="0">
+                  <a:solidFill>
+                    <a:schemeClr val="accent6">
+                      <a:lumMod val="75000"/>
+                    </a:schemeClr>
+                  </a:solidFill>
+                  <a:latin typeface="BrownBagLunch" panose="02000603000000000000" pitchFamily="2" charset="0"/>
+                </a:rPr>
+                <a:t>SCREEN TOO SMALL FOR THIS APPLICATION</a:t>
+              </a:r>
+              <a:endParaRPr lang="en-US" sz="1800" dirty="0">
+                <a:solidFill>
+                  <a:schemeClr val="accent6">
+                    <a:lumMod val="75000"/>
+                  </a:schemeClr>
+                </a:solidFill>
+                <a:latin typeface="BrownBagLunch" panose="02000603000000000000" pitchFamily="2" charset="0"/>
+              </a:endParaRPr>
+            </a:p>
+          </p:txBody>
+        </p:sp>
+      </p:grpSp>
+      <p:grpSp>
+        <p:nvGrpSpPr>
+          <p:cNvPr id="1674" name="Group 1673"/>
+          <p:cNvGrpSpPr/>
+          <p:nvPr/>
+        </p:nvGrpSpPr>
+        <p:grpSpPr>
+          <a:xfrm>
+            <a:off x="19896895" y="5394426"/>
+            <a:ext cx="1540550" cy="905375"/>
+            <a:chOff x="20265805" y="3422703"/>
+            <a:chExt cx="1540550" cy="744668"/>
+          </a:xfrm>
+        </p:grpSpPr>
+        <p:sp>
+          <p:nvSpPr>
+            <p:cNvPr id="1675" name="Rectangle 1674"/>
+            <p:cNvSpPr/>
+            <p:nvPr/>
+          </p:nvSpPr>
+          <p:spPr>
+            <a:xfrm>
+              <a:off x="20325079" y="3422705"/>
+              <a:ext cx="1417776" cy="744666"/>
+            </a:xfrm>
+            <a:prstGeom prst="rect">
+              <a:avLst/>
+            </a:prstGeom>
+            <a:solidFill>
+              <a:schemeClr val="accent4">
+                <a:lumMod val="40000"/>
+                <a:lumOff val="60000"/>
+              </a:schemeClr>
+            </a:solidFill>
+            <a:ln w="22225">
+              <a:noFill/>
+            </a:ln>
+            <a:effectLst/>
+          </p:spPr>
+          <p:style>
+            <a:lnRef idx="2">
+              <a:schemeClr val="accent1">
+                <a:shade val="50000"/>
+              </a:schemeClr>
+            </a:lnRef>
+            <a:fillRef idx="1">
+              <a:schemeClr val="accent1"/>
+            </a:fillRef>
+            <a:effectRef idx="0">
+              <a:schemeClr val="accent1"/>
+            </a:effectRef>
+            <a:fontRef idx="minor">
+              <a:schemeClr val="lt1"/>
+            </a:fontRef>
+          </p:style>
+          <p:txBody>
+            <a:bodyPr rtlCol="0" anchor="ctr"/>
+            <a:lstStyle/>
+            <a:p>
+              <a:pPr algn="ctr"/>
+              <a:endParaRPr lang="en-US">
+                <a:solidFill>
+                  <a:schemeClr val="accent4">
+                    <a:lumMod val="75000"/>
+                  </a:schemeClr>
+                </a:solidFill>
+              </a:endParaRPr>
+            </a:p>
+          </p:txBody>
+        </p:sp>
+        <p:sp>
+          <p:nvSpPr>
+            <p:cNvPr id="1676" name="Rectangle 1675"/>
+            <p:cNvSpPr/>
+            <p:nvPr/>
+          </p:nvSpPr>
+          <p:spPr>
+            <a:xfrm>
+              <a:off x="20265805" y="3422703"/>
+              <a:ext cx="1540550" cy="666471"/>
+            </a:xfrm>
+            <a:prstGeom prst="rect">
+              <a:avLst/>
+            </a:prstGeom>
+            <a:noFill/>
+            <a:ln>
+              <a:noFill/>
+            </a:ln>
+          </p:spPr>
+          <p:style>
+            <a:lnRef idx="2">
+              <a:schemeClr val="accent1">
+                <a:shade val="50000"/>
+              </a:schemeClr>
+            </a:lnRef>
+            <a:fillRef idx="1">
+              <a:schemeClr val="accent1"/>
+            </a:fillRef>
+            <a:effectRef idx="0">
+              <a:schemeClr val="accent1"/>
+            </a:effectRef>
+            <a:fontRef idx="minor">
+              <a:schemeClr val="lt1"/>
+            </a:fontRef>
+          </p:style>
+          <p:txBody>
+            <a:bodyPr rtlCol="0" anchor="ctr"/>
+            <a:lstStyle/>
+            <a:p>
+              <a:pPr algn="ctr"/>
+              <a:r>
+                <a:rPr lang="en-US" sz="1800" dirty="0" smtClean="0">
+                  <a:solidFill>
+                    <a:schemeClr val="accent4">
+                      <a:lumMod val="75000"/>
+                    </a:schemeClr>
+                  </a:solidFill>
+                  <a:latin typeface="BrownBagLunch" panose="02000603000000000000" pitchFamily="2" charset="0"/>
+                </a:rPr>
+                <a:t>SCREEN TOO SMALL FOR THIS APPLICATION</a:t>
+              </a:r>
+              <a:endParaRPr lang="en-US" sz="1800" dirty="0">
+                <a:solidFill>
+                  <a:schemeClr val="accent4">
+                    <a:lumMod val="75000"/>
+                  </a:schemeClr>
+                </a:solidFill>
+                <a:latin typeface="BrownBagLunch" panose="02000603000000000000" pitchFamily="2" charset="0"/>
+              </a:endParaRPr>
+            </a:p>
+          </p:txBody>
+        </p:sp>
+      </p:grpSp>
+      <p:grpSp>
+        <p:nvGrpSpPr>
+          <p:cNvPr id="1677" name="Group 1676"/>
+          <p:cNvGrpSpPr/>
+          <p:nvPr/>
+        </p:nvGrpSpPr>
+        <p:grpSpPr>
+          <a:xfrm>
+            <a:off x="21529365" y="5399991"/>
+            <a:ext cx="1540550" cy="905375"/>
+            <a:chOff x="20265805" y="3422703"/>
+            <a:chExt cx="1540550" cy="744668"/>
+          </a:xfrm>
+        </p:grpSpPr>
+        <p:sp>
+          <p:nvSpPr>
+            <p:cNvPr id="1678" name="Rectangle 1677"/>
+            <p:cNvSpPr/>
+            <p:nvPr/>
+          </p:nvSpPr>
+          <p:spPr>
+            <a:xfrm>
+              <a:off x="20325079" y="3422705"/>
+              <a:ext cx="1417776" cy="744666"/>
+            </a:xfrm>
+            <a:prstGeom prst="rect">
+              <a:avLst/>
+            </a:prstGeom>
+            <a:solidFill>
+              <a:srgbClr val="E0BFE3"/>
+            </a:solidFill>
+            <a:ln w="22225">
+              <a:noFill/>
+            </a:ln>
+            <a:effectLst/>
+          </p:spPr>
+          <p:style>
+            <a:lnRef idx="2">
+              <a:schemeClr val="accent1">
+                <a:shade val="50000"/>
+              </a:schemeClr>
+            </a:lnRef>
+            <a:fillRef idx="1">
+              <a:schemeClr val="accent1"/>
+            </a:fillRef>
+            <a:effectRef idx="0">
+              <a:schemeClr val="accent1"/>
+            </a:effectRef>
+            <a:fontRef idx="minor">
+              <a:schemeClr val="lt1"/>
+            </a:fontRef>
+          </p:style>
+          <p:txBody>
+            <a:bodyPr rtlCol="0" anchor="ctr"/>
+            <a:lstStyle/>
+            <a:p>
+              <a:pPr algn="ctr"/>
+              <a:endParaRPr lang="en-US">
+                <a:solidFill>
+                  <a:schemeClr val="accent5">
+                    <a:lumMod val="75000"/>
+                  </a:schemeClr>
+                </a:solidFill>
+              </a:endParaRPr>
+            </a:p>
+          </p:txBody>
+        </p:sp>
+        <p:sp>
+          <p:nvSpPr>
+            <p:cNvPr id="1679" name="Rectangle 1678"/>
+            <p:cNvSpPr/>
+            <p:nvPr/>
+          </p:nvSpPr>
+          <p:spPr>
+            <a:xfrm>
+              <a:off x="20265805" y="3422703"/>
+              <a:ext cx="1540550" cy="666471"/>
+            </a:xfrm>
+            <a:prstGeom prst="rect">
+              <a:avLst/>
+            </a:prstGeom>
+            <a:noFill/>
+            <a:ln>
+              <a:noFill/>
+            </a:ln>
+          </p:spPr>
+          <p:style>
+            <a:lnRef idx="2">
+              <a:schemeClr val="accent1">
+                <a:shade val="50000"/>
+              </a:schemeClr>
+            </a:lnRef>
+            <a:fillRef idx="1">
+              <a:schemeClr val="accent1"/>
+            </a:fillRef>
+            <a:effectRef idx="0">
+              <a:schemeClr val="accent1"/>
+            </a:effectRef>
+            <a:fontRef idx="minor">
+              <a:schemeClr val="lt1"/>
+            </a:fontRef>
+          </p:style>
+          <p:txBody>
+            <a:bodyPr rtlCol="0" anchor="ctr"/>
+            <a:lstStyle/>
+            <a:p>
+              <a:pPr algn="ctr"/>
+              <a:r>
+                <a:rPr lang="en-US" sz="1800" dirty="0" smtClean="0">
+                  <a:solidFill>
+                    <a:srgbClr val="643282"/>
+                  </a:solidFill>
+                  <a:latin typeface="BrownBagLunch" panose="02000603000000000000" pitchFamily="2" charset="0"/>
+                </a:rPr>
+                <a:t>SCREEN TOO SMALL FOR THIS APPLICATION</a:t>
+              </a:r>
+              <a:endParaRPr lang="en-US" sz="1800" dirty="0">
+                <a:solidFill>
+                  <a:srgbClr val="643282"/>
+                </a:solidFill>
+                <a:latin typeface="BrownBagLunch" panose="02000603000000000000" pitchFamily="2" charset="0"/>
+              </a:endParaRPr>
+            </a:p>
+          </p:txBody>
+        </p:sp>
+      </p:grpSp>
+      <p:grpSp>
+        <p:nvGrpSpPr>
+          <p:cNvPr id="1680" name="Group 1679"/>
+          <p:cNvGrpSpPr/>
+          <p:nvPr/>
+        </p:nvGrpSpPr>
+        <p:grpSpPr>
+          <a:xfrm>
+            <a:off x="19899073" y="6349947"/>
+            <a:ext cx="1540550" cy="905375"/>
+            <a:chOff x="20265805" y="3422703"/>
+            <a:chExt cx="1540550" cy="744668"/>
+          </a:xfrm>
+        </p:grpSpPr>
+        <p:sp>
+          <p:nvSpPr>
+            <p:cNvPr id="1681" name="Rectangle 1680"/>
+            <p:cNvSpPr/>
+            <p:nvPr/>
+          </p:nvSpPr>
+          <p:spPr>
+            <a:xfrm>
+              <a:off x="20325079" y="3422705"/>
+              <a:ext cx="1417776" cy="744666"/>
+            </a:xfrm>
+            <a:prstGeom prst="rect">
+              <a:avLst/>
+            </a:prstGeom>
+            <a:solidFill>
+              <a:schemeClr val="accent2">
+                <a:lumMod val="40000"/>
+                <a:lumOff val="60000"/>
+              </a:schemeClr>
+            </a:solidFill>
+            <a:ln w="22225">
+              <a:noFill/>
+            </a:ln>
+            <a:effectLst/>
+          </p:spPr>
+          <p:style>
+            <a:lnRef idx="2">
+              <a:schemeClr val="accent1">
+                <a:shade val="50000"/>
+              </a:schemeClr>
+            </a:lnRef>
+            <a:fillRef idx="1">
+              <a:schemeClr val="accent1"/>
+            </a:fillRef>
+            <a:effectRef idx="0">
+              <a:schemeClr val="accent1"/>
+            </a:effectRef>
+            <a:fontRef idx="minor">
+              <a:schemeClr val="lt1"/>
+            </a:fontRef>
+          </p:style>
+          <p:txBody>
+            <a:bodyPr rtlCol="0" anchor="ctr"/>
+            <a:lstStyle/>
+            <a:p>
+              <a:pPr algn="ctr"/>
+              <a:endParaRPr lang="en-US">
+                <a:solidFill>
+                  <a:schemeClr val="accent5">
+                    <a:lumMod val="75000"/>
+                  </a:schemeClr>
+                </a:solidFill>
+              </a:endParaRPr>
+            </a:p>
+          </p:txBody>
+        </p:sp>
+        <p:sp>
+          <p:nvSpPr>
+            <p:cNvPr id="1682" name="Rectangle 1681"/>
+            <p:cNvSpPr/>
+            <p:nvPr/>
+          </p:nvSpPr>
+          <p:spPr>
+            <a:xfrm>
+              <a:off x="20265805" y="3422703"/>
+              <a:ext cx="1540550" cy="666471"/>
+            </a:xfrm>
+            <a:prstGeom prst="rect">
+              <a:avLst/>
+            </a:prstGeom>
+            <a:noFill/>
+            <a:ln>
+              <a:noFill/>
+            </a:ln>
+          </p:spPr>
+          <p:style>
+            <a:lnRef idx="2">
+              <a:schemeClr val="accent1">
+                <a:shade val="50000"/>
+              </a:schemeClr>
+            </a:lnRef>
+            <a:fillRef idx="1">
+              <a:schemeClr val="accent1"/>
+            </a:fillRef>
+            <a:effectRef idx="0">
+              <a:schemeClr val="accent1"/>
+            </a:effectRef>
+            <a:fontRef idx="minor">
+              <a:schemeClr val="lt1"/>
+            </a:fontRef>
+          </p:style>
+          <p:txBody>
+            <a:bodyPr rtlCol="0" anchor="ctr"/>
+            <a:lstStyle/>
+            <a:p>
+              <a:pPr algn="ctr"/>
+              <a:r>
+                <a:rPr lang="en-US" sz="1800" dirty="0" smtClean="0">
+                  <a:solidFill>
+                    <a:schemeClr val="accent2">
+                      <a:lumMod val="75000"/>
+                    </a:schemeClr>
+                  </a:solidFill>
+                  <a:latin typeface="BrownBagLunch" panose="02000603000000000000" pitchFamily="2" charset="0"/>
+                </a:rPr>
+                <a:t>SCREEN TOO SMALL FOR THIS APPLICATION</a:t>
+              </a:r>
+              <a:endParaRPr lang="en-US" sz="1800" dirty="0">
+                <a:solidFill>
+                  <a:schemeClr val="accent2">
+                    <a:lumMod val="75000"/>
+                  </a:schemeClr>
+                </a:solidFill>
+                <a:latin typeface="BrownBagLunch" panose="02000603000000000000" pitchFamily="2" charset="0"/>
+              </a:endParaRPr>
+            </a:p>
+          </p:txBody>
+        </p:sp>
+      </p:grpSp>
+      <p:grpSp>
+        <p:nvGrpSpPr>
+          <p:cNvPr id="1683" name="Group 1682"/>
+          <p:cNvGrpSpPr/>
+          <p:nvPr/>
+        </p:nvGrpSpPr>
+        <p:grpSpPr>
+          <a:xfrm>
+            <a:off x="21531543" y="6355512"/>
+            <a:ext cx="1540550" cy="905375"/>
+            <a:chOff x="20265805" y="3422703"/>
+            <a:chExt cx="1540550" cy="744668"/>
+          </a:xfrm>
+        </p:grpSpPr>
+        <p:sp>
+          <p:nvSpPr>
+            <p:cNvPr id="1684" name="Rectangle 1683"/>
+            <p:cNvSpPr/>
+            <p:nvPr/>
+          </p:nvSpPr>
+          <p:spPr>
+            <a:xfrm>
+              <a:off x="20325079" y="3422705"/>
+              <a:ext cx="1417776" cy="744666"/>
+            </a:xfrm>
+            <a:prstGeom prst="rect">
+              <a:avLst/>
+            </a:prstGeom>
+            <a:solidFill>
+              <a:srgbClr val="F9B7B5"/>
+            </a:solidFill>
+            <a:ln w="22225">
+              <a:noFill/>
+            </a:ln>
+            <a:effectLst/>
+          </p:spPr>
+          <p:style>
+            <a:lnRef idx="2">
+              <a:schemeClr val="accent1">
+                <a:shade val="50000"/>
+              </a:schemeClr>
+            </a:lnRef>
+            <a:fillRef idx="1">
+              <a:schemeClr val="accent1"/>
+            </a:fillRef>
+            <a:effectRef idx="0">
+              <a:schemeClr val="accent1"/>
+            </a:effectRef>
+            <a:fontRef idx="minor">
+              <a:schemeClr val="lt1"/>
+            </a:fontRef>
+          </p:style>
+          <p:txBody>
+            <a:bodyPr rtlCol="0" anchor="ctr"/>
+            <a:lstStyle/>
+            <a:p>
+              <a:pPr algn="ctr"/>
+              <a:endParaRPr lang="en-US">
+                <a:solidFill>
+                  <a:schemeClr val="accent5">
+                    <a:lumMod val="75000"/>
+                  </a:schemeClr>
+                </a:solidFill>
+              </a:endParaRPr>
+            </a:p>
+          </p:txBody>
+        </p:sp>
+        <p:sp>
+          <p:nvSpPr>
+            <p:cNvPr id="1685" name="Rectangle 1684"/>
+            <p:cNvSpPr/>
+            <p:nvPr/>
+          </p:nvSpPr>
+          <p:spPr>
+            <a:xfrm>
+              <a:off x="20265805" y="3422703"/>
+              <a:ext cx="1540550" cy="666471"/>
+            </a:xfrm>
+            <a:prstGeom prst="rect">
+              <a:avLst/>
+            </a:prstGeom>
+            <a:noFill/>
+            <a:ln>
+              <a:noFill/>
+            </a:ln>
+          </p:spPr>
+          <p:style>
+            <a:lnRef idx="2">
+              <a:schemeClr val="accent1">
+                <a:shade val="50000"/>
+              </a:schemeClr>
+            </a:lnRef>
+            <a:fillRef idx="1">
+              <a:schemeClr val="accent1"/>
+            </a:fillRef>
+            <a:effectRef idx="0">
+              <a:schemeClr val="accent1"/>
+            </a:effectRef>
+            <a:fontRef idx="minor">
+              <a:schemeClr val="lt1"/>
+            </a:fontRef>
+          </p:style>
+          <p:txBody>
+            <a:bodyPr rtlCol="0" anchor="ctr"/>
+            <a:lstStyle/>
+            <a:p>
+              <a:pPr algn="ctr"/>
+              <a:r>
+                <a:rPr lang="en-US" sz="1800" dirty="0" smtClean="0">
+                  <a:solidFill>
+                    <a:srgbClr val="D93427"/>
+                  </a:solidFill>
+                  <a:latin typeface="BrownBagLunch" panose="02000603000000000000" pitchFamily="2" charset="0"/>
+                </a:rPr>
+                <a:t>SCREEN TOO SMALL FOR THIS APPLICATION</a:t>
+              </a:r>
+              <a:endParaRPr lang="en-US" sz="1800" dirty="0">
+                <a:solidFill>
+                  <a:srgbClr val="D93427"/>
+                </a:solidFill>
+                <a:latin typeface="BrownBagLunch" panose="02000603000000000000" pitchFamily="2" charset="0"/>
+              </a:endParaRPr>
+            </a:p>
+          </p:txBody>
+        </p:sp>
+      </p:grpSp>
     </p:spTree>
     <p:extLst>
       <p:ext uri="{BB962C8B-B14F-4D97-AF65-F5344CB8AC3E}">

</xml_diff>